<commit_message>
latest version, still draft
</commit_message>
<xml_diff>
--- a/KubernetesMinikubeHelm_1.pptx
+++ b/KubernetesMinikubeHelm_1.pptx
@@ -2371,8 +2371,8 @@
         </p:nvSpPr>
         <p:spPr>
           <a:xfrm>
-            <a:off x="418000" y="1791023"/>
-            <a:ext cx="8145899" cy="2001904"/>
+            <a:off x="418000" y="1791024"/>
+            <a:ext cx="8145899" cy="2001903"/>
           </a:xfrm>
           <a:prstGeom prst="rect">
             <a:avLst/>
@@ -2427,10 +2427,6 @@
           </p:nvPr>
         </p:nvSpPr>
         <p:spPr>
-          <a:xfrm>
-            <a:off x="418000" y="1791023"/>
-            <a:ext cx="5093400" cy="2001904"/>
-          </a:xfrm>
           <a:prstGeom prst="rect">
             <a:avLst/>
           </a:prstGeom>
@@ -3067,10 +3063,6 @@
           </p:nvPr>
         </p:nvSpPr>
         <p:spPr>
-          <a:xfrm>
-            <a:off x="418000" y="1791023"/>
-            <a:ext cx="5093400" cy="2001904"/>
-          </a:xfrm>
           <a:prstGeom prst="rect">
             <a:avLst/>
           </a:prstGeom>
@@ -3531,8 +3523,8 @@
         </p:nvSpPr>
         <p:spPr>
           <a:xfrm>
-            <a:off x="417997" y="1791023"/>
-            <a:ext cx="5784455" cy="2001904"/>
+            <a:off x="417997" y="1791024"/>
+            <a:ext cx="5784455" cy="2001903"/>
           </a:xfrm>
           <a:prstGeom prst="rect">
             <a:avLst/>
@@ -3832,10 +3824,6 @@
           </p:nvPr>
         </p:nvSpPr>
         <p:spPr>
-          <a:xfrm>
-            <a:off x="418000" y="1791023"/>
-            <a:ext cx="5093400" cy="2001904"/>
-          </a:xfrm>
           <a:prstGeom prst="rect">
             <a:avLst/>
           </a:prstGeom>
@@ -4066,10 +4054,6 @@
           </p:nvPr>
         </p:nvSpPr>
         <p:spPr>
-          <a:xfrm>
-            <a:off x="418000" y="1791023"/>
-            <a:ext cx="5093400" cy="2001904"/>
-          </a:xfrm>
           <a:prstGeom prst="rect">
             <a:avLst/>
           </a:prstGeom>
@@ -4541,8 +4525,8 @@
         </p:nvSpPr>
         <p:spPr>
           <a:xfrm>
-            <a:off x="490248" y="1259123"/>
-            <a:ext cx="6367804" cy="2493604"/>
+            <a:off x="490249" y="1259124"/>
+            <a:ext cx="6367803" cy="2493603"/>
           </a:xfrm>
           <a:prstGeom prst="rect">
             <a:avLst/>
@@ -4645,8 +4629,8 @@
         </p:nvSpPr>
         <p:spPr>
           <a:xfrm>
-            <a:off x="311699" y="1152475"/>
-            <a:ext cx="8520602" cy="3416400"/>
+            <a:off x="311699" y="1148598"/>
+            <a:ext cx="8520602" cy="3504036"/>
           </a:xfrm>
           <a:prstGeom prst="rect">
             <a:avLst/>
@@ -4710,8 +4694,8 @@
         </p:blipFill>
         <p:spPr>
           <a:xfrm>
-            <a:off x="469014" y="2267668"/>
-            <a:ext cx="4424984" cy="2204704"/>
+            <a:off x="1567564" y="2223218"/>
+            <a:ext cx="4886160" cy="2434481"/>
           </a:xfrm>
           <a:prstGeom prst="rect">
             <a:avLst/>

</xml_diff>